<commit_message>
Add mocks for detail views of adverse events and class explorer.
</commit_message>
<xml_diff>
--- a/doc/design_artifacts/drug_detail_mockup.pptx
+++ b/doc/design_artifacts/drug_detail_mockup.pptx
@@ -6,6 +6,9 @@
   </p:sldMasterIdLst>
   <p:sldIdLst>
     <p:sldId id="256" r:id="rId2"/>
+    <p:sldId id="257" r:id="rId3"/>
+    <p:sldId id="259" r:id="rId4"/>
+    <p:sldId id="258" r:id="rId5"/>
   </p:sldIdLst>
   <p:sldSz cx="9144000" cy="6858000" type="screen4x3"/>
   <p:notesSz cx="6858000" cy="9144000"/>
@@ -288,7 +291,7 @@
           <a:p>
             <a:fld id="{83A510F9-1899-8A42-AEF8-9D74F2D73728}" type="datetimeFigureOut">
               <a:rPr lang="en-US" smtClean="0"/>
-              <a:t>6/19/15</a:t>
+              <a:t>6/25/15</a:t>
             </a:fld>
             <a:endParaRPr lang="en-US"/>
           </a:p>
@@ -458,7 +461,7 @@
           <a:p>
             <a:fld id="{83A510F9-1899-8A42-AEF8-9D74F2D73728}" type="datetimeFigureOut">
               <a:rPr lang="en-US" smtClean="0"/>
-              <a:t>6/19/15</a:t>
+              <a:t>6/25/15</a:t>
             </a:fld>
             <a:endParaRPr lang="en-US"/>
           </a:p>
@@ -638,7 +641,7 @@
           <a:p>
             <a:fld id="{83A510F9-1899-8A42-AEF8-9D74F2D73728}" type="datetimeFigureOut">
               <a:rPr lang="en-US" smtClean="0"/>
-              <a:t>6/19/15</a:t>
+              <a:t>6/25/15</a:t>
             </a:fld>
             <a:endParaRPr lang="en-US"/>
           </a:p>
@@ -808,7 +811,7 @@
           <a:p>
             <a:fld id="{83A510F9-1899-8A42-AEF8-9D74F2D73728}" type="datetimeFigureOut">
               <a:rPr lang="en-US" smtClean="0"/>
-              <a:t>6/19/15</a:t>
+              <a:t>6/25/15</a:t>
             </a:fld>
             <a:endParaRPr lang="en-US"/>
           </a:p>
@@ -1054,7 +1057,7 @@
           <a:p>
             <a:fld id="{83A510F9-1899-8A42-AEF8-9D74F2D73728}" type="datetimeFigureOut">
               <a:rPr lang="en-US" smtClean="0"/>
-              <a:t>6/19/15</a:t>
+              <a:t>6/25/15</a:t>
             </a:fld>
             <a:endParaRPr lang="en-US"/>
           </a:p>
@@ -1342,7 +1345,7 @@
           <a:p>
             <a:fld id="{83A510F9-1899-8A42-AEF8-9D74F2D73728}" type="datetimeFigureOut">
               <a:rPr lang="en-US" smtClean="0"/>
-              <a:t>6/19/15</a:t>
+              <a:t>6/25/15</a:t>
             </a:fld>
             <a:endParaRPr lang="en-US"/>
           </a:p>
@@ -1764,7 +1767,7 @@
           <a:p>
             <a:fld id="{83A510F9-1899-8A42-AEF8-9D74F2D73728}" type="datetimeFigureOut">
               <a:rPr lang="en-US" smtClean="0"/>
-              <a:t>6/19/15</a:t>
+              <a:t>6/25/15</a:t>
             </a:fld>
             <a:endParaRPr lang="en-US"/>
           </a:p>
@@ -1882,7 +1885,7 @@
           <a:p>
             <a:fld id="{83A510F9-1899-8A42-AEF8-9D74F2D73728}" type="datetimeFigureOut">
               <a:rPr lang="en-US" smtClean="0"/>
-              <a:t>6/19/15</a:t>
+              <a:t>6/25/15</a:t>
             </a:fld>
             <a:endParaRPr lang="en-US"/>
           </a:p>
@@ -1977,7 +1980,7 @@
           <a:p>
             <a:fld id="{83A510F9-1899-8A42-AEF8-9D74F2D73728}" type="datetimeFigureOut">
               <a:rPr lang="en-US" smtClean="0"/>
-              <a:t>6/19/15</a:t>
+              <a:t>6/25/15</a:t>
             </a:fld>
             <a:endParaRPr lang="en-US"/>
           </a:p>
@@ -2254,7 +2257,7 @@
           <a:p>
             <a:fld id="{83A510F9-1899-8A42-AEF8-9D74F2D73728}" type="datetimeFigureOut">
               <a:rPr lang="en-US" smtClean="0"/>
-              <a:t>6/19/15</a:t>
+              <a:t>6/25/15</a:t>
             </a:fld>
             <a:endParaRPr lang="en-US"/>
           </a:p>
@@ -2507,7 +2510,7 @@
           <a:p>
             <a:fld id="{83A510F9-1899-8A42-AEF8-9D74F2D73728}" type="datetimeFigureOut">
               <a:rPr lang="en-US" smtClean="0"/>
-              <a:t>6/19/15</a:t>
+              <a:t>6/25/15</a:t>
             </a:fld>
             <a:endParaRPr lang="en-US"/>
           </a:p>
@@ -2720,7 +2723,7 @@
           <a:p>
             <a:fld id="{83A510F9-1899-8A42-AEF8-9D74F2D73728}" type="datetimeFigureOut">
               <a:rPr lang="en-US" smtClean="0"/>
-              <a:t>6/19/15</a:t>
+              <a:t>6/25/15</a:t>
             </a:fld>
             <a:endParaRPr lang="en-US"/>
           </a:p>
@@ -3566,6 +3569,839 @@
     <p:extLst>
       <p:ext uri="{BB962C8B-B14F-4D97-AF65-F5344CB8AC3E}">
         <p14:creationId xmlns:p14="http://schemas.microsoft.com/office/powerpoint/2010/main" val="3340869721"/>
+      </p:ext>
+    </p:extLst>
+  </p:cSld>
+  <p:clrMapOvr>
+    <a:masterClrMapping/>
+  </p:clrMapOvr>
+</p:sld>
+</file>
+
+<file path=ppt/slides/slide2.xml><?xml version="1.0" encoding="utf-8"?>
+<p:sld xmlns:a="http://schemas.openxmlformats.org/drawingml/2006/main" xmlns:r="http://schemas.openxmlformats.org/officeDocument/2006/relationships" xmlns:p="http://schemas.openxmlformats.org/presentationml/2006/main">
+  <p:cSld>
+    <p:spTree>
+      <p:nvGrpSpPr>
+        <p:cNvPr id="1" name=""/>
+        <p:cNvGrpSpPr/>
+        <p:nvPr/>
+      </p:nvGrpSpPr>
+      <p:grpSpPr>
+        <a:xfrm>
+          <a:off x="0" y="0"/>
+          <a:ext cx="0" cy="0"/>
+          <a:chOff x="0" y="0"/>
+          <a:chExt cx="0" cy="0"/>
+        </a:xfrm>
+      </p:grpSpPr>
+      <p:sp>
+        <p:nvSpPr>
+          <p:cNvPr id="2" name="Title 1"/>
+          <p:cNvSpPr>
+            <a:spLocks noGrp="1"/>
+          </p:cNvSpPr>
+          <p:nvPr>
+            <p:ph type="title"/>
+          </p:nvPr>
+        </p:nvSpPr>
+        <p:spPr>
+          <a:xfrm>
+            <a:off x="457200" y="274638"/>
+            <a:ext cx="8229600" cy="540717"/>
+          </a:xfrm>
+        </p:spPr>
+        <p:txBody>
+          <a:bodyPr>
+            <a:noAutofit/>
+          </a:bodyPr>
+          <a:lstStyle/>
+          <a:p>
+            <a:r>
+              <a:rPr lang="en-US" sz="3200" dirty="0" smtClean="0">
+                <a:latin typeface="Helvetica Neue"/>
+                <a:cs typeface="Helvetica Neue"/>
+              </a:rPr>
+              <a:t>Drug Class or Indication Explorer</a:t>
+            </a:r>
+            <a:endParaRPr lang="en-US" sz="3200" dirty="0">
+              <a:latin typeface="Helvetica Neue"/>
+              <a:cs typeface="Helvetica Neue"/>
+            </a:endParaRPr>
+          </a:p>
+        </p:txBody>
+      </p:sp>
+      <p:pic>
+        <p:nvPicPr>
+          <p:cNvPr id="3" name="Picture 2" descr="Screen Shot 2015-06-25 at 10.01.54 AM.png"/>
+          <p:cNvPicPr>
+            <a:picLocks noChangeAspect="1"/>
+          </p:cNvPicPr>
+          <p:nvPr/>
+        </p:nvPicPr>
+        <p:blipFill>
+          <a:blip r:embed="rId2">
+            <a:extLst>
+              <a:ext uri="{28A0092B-C50C-407E-A947-70E740481C1C}">
+                <a14:useLocalDpi xmlns:a14="http://schemas.microsoft.com/office/drawing/2010/main" val="0"/>
+              </a:ext>
+            </a:extLst>
+          </a:blip>
+          <a:stretch>
+            <a:fillRect/>
+          </a:stretch>
+        </p:blipFill>
+        <p:spPr>
+          <a:xfrm>
+            <a:off x="156776" y="1136965"/>
+            <a:ext cx="5491103" cy="423516"/>
+          </a:xfrm>
+          <a:prstGeom prst="rect">
+            <a:avLst/>
+          </a:prstGeom>
+        </p:spPr>
+      </p:pic>
+      <p:pic>
+        <p:nvPicPr>
+          <p:cNvPr id="4" name="Picture 3" descr="Screen Shot 2015-06-25 at 9.15.58 AM.png"/>
+          <p:cNvPicPr>
+            <a:picLocks noChangeAspect="1"/>
+          </p:cNvPicPr>
+          <p:nvPr/>
+        </p:nvPicPr>
+        <p:blipFill>
+          <a:blip r:embed="rId3">
+            <a:extLst>
+              <a:ext uri="{28A0092B-C50C-407E-A947-70E740481C1C}">
+                <a14:useLocalDpi xmlns:a14="http://schemas.microsoft.com/office/drawing/2010/main" val="0"/>
+              </a:ext>
+            </a:extLst>
+          </a:blip>
+          <a:stretch>
+            <a:fillRect/>
+          </a:stretch>
+        </p:blipFill>
+        <p:spPr>
+          <a:xfrm>
+            <a:off x="2586815" y="1560481"/>
+            <a:ext cx="3656815" cy="4895520"/>
+          </a:xfrm>
+          <a:prstGeom prst="rect">
+            <a:avLst/>
+          </a:prstGeom>
+        </p:spPr>
+      </p:pic>
+      <p:sp>
+        <p:nvSpPr>
+          <p:cNvPr id="5" name="TextBox 4"/>
+          <p:cNvSpPr txBox="1"/>
+          <p:nvPr/>
+        </p:nvSpPr>
+        <p:spPr>
+          <a:xfrm>
+            <a:off x="156776" y="2628111"/>
+            <a:ext cx="3245278" cy="646331"/>
+          </a:xfrm>
+          <a:prstGeom prst="rect">
+            <a:avLst/>
+          </a:prstGeom>
+          <a:noFill/>
+        </p:spPr>
+        <p:txBody>
+          <a:bodyPr wrap="square" rtlCol="0">
+            <a:spAutoFit/>
+          </a:bodyPr>
+          <a:lstStyle/>
+          <a:p>
+            <a:r>
+              <a:rPr lang="en-US" dirty="0" smtClean="0"/>
+              <a:t>Start with class or indication </a:t>
+            </a:r>
+            <a:r>
+              <a:rPr lang="en-US" dirty="0"/>
+              <a:t>(e.g., </a:t>
+            </a:r>
+            <a:r>
+              <a:rPr lang="en-US" dirty="0" smtClean="0"/>
+              <a:t>NSAID or pain reliever)</a:t>
+            </a:r>
+            <a:endParaRPr lang="en-US" dirty="0"/>
+          </a:p>
+        </p:txBody>
+      </p:sp>
+      <p:sp>
+        <p:nvSpPr>
+          <p:cNvPr id="6" name="TextBox 5"/>
+          <p:cNvSpPr txBox="1"/>
+          <p:nvPr/>
+        </p:nvSpPr>
+        <p:spPr>
+          <a:xfrm>
+            <a:off x="4620991" y="5085457"/>
+            <a:ext cx="3245278" cy="646331"/>
+          </a:xfrm>
+          <a:prstGeom prst="rect">
+            <a:avLst/>
+          </a:prstGeom>
+          <a:noFill/>
+        </p:spPr>
+        <p:txBody>
+          <a:bodyPr wrap="square" rtlCol="0">
+            <a:spAutoFit/>
+          </a:bodyPr>
+          <a:lstStyle/>
+          <a:p>
+            <a:r>
+              <a:rPr lang="en-US" dirty="0" smtClean="0"/>
+              <a:t>Compare drugs within classes or across classes</a:t>
+            </a:r>
+            <a:endParaRPr lang="en-US" dirty="0"/>
+          </a:p>
+        </p:txBody>
+      </p:sp>
+      <p:cxnSp>
+        <p:nvCxnSpPr>
+          <p:cNvPr id="8" name="Straight Arrow Connector 7"/>
+          <p:cNvCxnSpPr>
+            <a:stCxn id="6" idx="1"/>
+          </p:cNvCxnSpPr>
+          <p:nvPr/>
+        </p:nvCxnSpPr>
+        <p:spPr>
+          <a:xfrm flipH="1" flipV="1">
+            <a:off x="4217293" y="4860772"/>
+            <a:ext cx="403698" cy="547851"/>
+          </a:xfrm>
+          <a:prstGeom prst="straightConnector1">
+            <a:avLst/>
+          </a:prstGeom>
+          <a:ln>
+            <a:solidFill>
+              <a:schemeClr val="accent6"/>
+            </a:solidFill>
+            <a:tailEnd type="triangle" w="med" len="lg"/>
+          </a:ln>
+          <a:effectLst/>
+        </p:spPr>
+        <p:style>
+          <a:lnRef idx="2">
+            <a:schemeClr val="accent1"/>
+          </a:lnRef>
+          <a:fillRef idx="0">
+            <a:schemeClr val="accent1"/>
+          </a:fillRef>
+          <a:effectRef idx="1">
+            <a:schemeClr val="accent1"/>
+          </a:effectRef>
+          <a:fontRef idx="minor">
+            <a:schemeClr val="tx1"/>
+          </a:fontRef>
+        </p:style>
+      </p:cxnSp>
+      <p:sp>
+        <p:nvSpPr>
+          <p:cNvPr id="9" name="TextBox 8"/>
+          <p:cNvSpPr txBox="1"/>
+          <p:nvPr/>
+        </p:nvSpPr>
+        <p:spPr>
+          <a:xfrm>
+            <a:off x="5898722" y="2304945"/>
+            <a:ext cx="3245278" cy="646331"/>
+          </a:xfrm>
+          <a:prstGeom prst="rect">
+            <a:avLst/>
+          </a:prstGeom>
+          <a:noFill/>
+        </p:spPr>
+        <p:txBody>
+          <a:bodyPr wrap="square" rtlCol="0">
+            <a:spAutoFit/>
+          </a:bodyPr>
+          <a:lstStyle/>
+          <a:p>
+            <a:r>
+              <a:rPr lang="en-US" dirty="0" smtClean="0"/>
+              <a:t>Investigate report adverse events or listed side-effects</a:t>
+            </a:r>
+            <a:endParaRPr lang="en-US" dirty="0"/>
+          </a:p>
+        </p:txBody>
+      </p:sp>
+      <p:cxnSp>
+        <p:nvCxnSpPr>
+          <p:cNvPr id="10" name="Straight Arrow Connector 9"/>
+          <p:cNvCxnSpPr/>
+          <p:nvPr/>
+        </p:nvCxnSpPr>
+        <p:spPr>
+          <a:xfrm flipH="1">
+            <a:off x="5769382" y="2628112"/>
+            <a:ext cx="129340" cy="323164"/>
+          </a:xfrm>
+          <a:prstGeom prst="straightConnector1">
+            <a:avLst/>
+          </a:prstGeom>
+          <a:ln>
+            <a:solidFill>
+              <a:schemeClr val="accent6"/>
+            </a:solidFill>
+            <a:tailEnd type="triangle" w="med" len="lg"/>
+          </a:ln>
+          <a:effectLst/>
+        </p:spPr>
+        <p:style>
+          <a:lnRef idx="2">
+            <a:schemeClr val="accent1"/>
+          </a:lnRef>
+          <a:fillRef idx="0">
+            <a:schemeClr val="accent1"/>
+          </a:fillRef>
+          <a:effectRef idx="1">
+            <a:schemeClr val="accent1"/>
+          </a:effectRef>
+          <a:fontRef idx="minor">
+            <a:schemeClr val="tx1"/>
+          </a:fontRef>
+        </p:style>
+      </p:cxnSp>
+    </p:spTree>
+    <p:extLst>
+      <p:ext uri="{BB962C8B-B14F-4D97-AF65-F5344CB8AC3E}">
+        <p14:creationId xmlns:p14="http://schemas.microsoft.com/office/powerpoint/2010/main" val="2105013379"/>
+      </p:ext>
+    </p:extLst>
+  </p:cSld>
+  <p:clrMapOvr>
+    <a:masterClrMapping/>
+  </p:clrMapOvr>
+</p:sld>
+</file>
+
+<file path=ppt/slides/slide3.xml><?xml version="1.0" encoding="utf-8"?>
+<p:sld xmlns:a="http://schemas.openxmlformats.org/drawingml/2006/main" xmlns:r="http://schemas.openxmlformats.org/officeDocument/2006/relationships" xmlns:p="http://schemas.openxmlformats.org/presentationml/2006/main">
+  <p:cSld>
+    <p:spTree>
+      <p:nvGrpSpPr>
+        <p:cNvPr id="1" name=""/>
+        <p:cNvGrpSpPr/>
+        <p:nvPr/>
+      </p:nvGrpSpPr>
+      <p:grpSpPr>
+        <a:xfrm>
+          <a:off x="0" y="0"/>
+          <a:ext cx="0" cy="0"/>
+          <a:chOff x="0" y="0"/>
+          <a:chExt cx="0" cy="0"/>
+        </a:xfrm>
+      </p:grpSpPr>
+      <p:pic>
+        <p:nvPicPr>
+          <p:cNvPr id="2" name="Picture 1" descr="Screen Shot 2015-06-25 at 10.42.01 AM.png"/>
+          <p:cNvPicPr>
+            <a:picLocks noChangeAspect="1"/>
+          </p:cNvPicPr>
+          <p:nvPr/>
+        </p:nvPicPr>
+        <p:blipFill>
+          <a:blip r:embed="rId2">
+            <a:extLst>
+              <a:ext uri="{28A0092B-C50C-407E-A947-70E740481C1C}">
+                <a14:useLocalDpi xmlns:a14="http://schemas.microsoft.com/office/drawing/2010/main" val="0"/>
+              </a:ext>
+            </a:extLst>
+          </a:blip>
+          <a:stretch>
+            <a:fillRect/>
+          </a:stretch>
+        </p:blipFill>
+        <p:spPr>
+          <a:xfrm>
+            <a:off x="533041" y="1244883"/>
+            <a:ext cx="8248794" cy="4647208"/>
+          </a:xfrm>
+          <a:prstGeom prst="rect">
+            <a:avLst/>
+          </a:prstGeom>
+        </p:spPr>
+      </p:pic>
+      <p:sp>
+        <p:nvSpPr>
+          <p:cNvPr id="3" name="Title 2"/>
+          <p:cNvSpPr>
+            <a:spLocks noGrp="1"/>
+          </p:cNvSpPr>
+          <p:nvPr>
+            <p:ph type="title"/>
+          </p:nvPr>
+        </p:nvSpPr>
+        <p:spPr>
+          <a:xfrm>
+            <a:off x="457200" y="274638"/>
+            <a:ext cx="8229600" cy="477998"/>
+          </a:xfrm>
+        </p:spPr>
+        <p:txBody>
+          <a:bodyPr>
+            <a:normAutofit fontScale="90000"/>
+          </a:bodyPr>
+          <a:lstStyle/>
+          <a:p>
+            <a:r>
+              <a:rPr lang="en-US" sz="3200" dirty="0" smtClean="0">
+                <a:latin typeface="Helvetica"/>
+                <a:cs typeface="Helvetica"/>
+              </a:rPr>
+              <a:t>Drug adverse reports over time</a:t>
+            </a:r>
+            <a:endParaRPr lang="en-US" sz="3200" dirty="0">
+              <a:latin typeface="Helvetica"/>
+              <a:cs typeface="Helvetica"/>
+            </a:endParaRPr>
+          </a:p>
+        </p:txBody>
+      </p:sp>
+    </p:spTree>
+    <p:extLst>
+      <p:ext uri="{BB962C8B-B14F-4D97-AF65-F5344CB8AC3E}">
+        <p14:creationId xmlns:p14="http://schemas.microsoft.com/office/powerpoint/2010/main" val="3141291127"/>
+      </p:ext>
+    </p:extLst>
+  </p:cSld>
+  <p:clrMapOvr>
+    <a:masterClrMapping/>
+  </p:clrMapOvr>
+</p:sld>
+</file>
+
+<file path=ppt/slides/slide4.xml><?xml version="1.0" encoding="utf-8"?>
+<p:sld xmlns:a="http://schemas.openxmlformats.org/drawingml/2006/main" xmlns:r="http://schemas.openxmlformats.org/officeDocument/2006/relationships" xmlns:p="http://schemas.openxmlformats.org/presentationml/2006/main">
+  <p:cSld>
+    <p:spTree>
+      <p:nvGrpSpPr>
+        <p:cNvPr id="1" name=""/>
+        <p:cNvGrpSpPr/>
+        <p:nvPr/>
+      </p:nvGrpSpPr>
+      <p:grpSpPr>
+        <a:xfrm>
+          <a:off x="0" y="0"/>
+          <a:ext cx="0" cy="0"/>
+          <a:chOff x="0" y="0"/>
+          <a:chExt cx="0" cy="0"/>
+        </a:xfrm>
+      </p:grpSpPr>
+      <p:pic>
+        <p:nvPicPr>
+          <p:cNvPr id="2" name="Picture 1" descr="Screen Shot 2015-06-25 at 9.51.53 AM.png"/>
+          <p:cNvPicPr>
+            <a:picLocks noChangeAspect="1"/>
+          </p:cNvPicPr>
+          <p:nvPr/>
+        </p:nvPicPr>
+        <p:blipFill>
+          <a:blip r:embed="rId2">
+            <a:extLst>
+              <a:ext uri="{28A0092B-C50C-407E-A947-70E740481C1C}">
+                <a14:useLocalDpi xmlns:a14="http://schemas.microsoft.com/office/drawing/2010/main" val="0"/>
+              </a:ext>
+            </a:extLst>
+          </a:blip>
+          <a:stretch>
+            <a:fillRect/>
+          </a:stretch>
+        </p:blipFill>
+        <p:spPr>
+          <a:xfrm>
+            <a:off x="1422595" y="3962400"/>
+            <a:ext cx="2895600" cy="2895600"/>
+          </a:xfrm>
+          <a:prstGeom prst="rect">
+            <a:avLst/>
+          </a:prstGeom>
+        </p:spPr>
+      </p:pic>
+      <p:pic>
+        <p:nvPicPr>
+          <p:cNvPr id="3" name="Picture 2" descr="Screen Shot 2015-06-25 at 10.28.26 AM.png"/>
+          <p:cNvPicPr>
+            <a:picLocks noChangeAspect="1"/>
+          </p:cNvPicPr>
+          <p:nvPr/>
+        </p:nvPicPr>
+        <p:blipFill>
+          <a:blip r:embed="rId3">
+            <a:extLst>
+              <a:ext uri="{28A0092B-C50C-407E-A947-70E740481C1C}">
+                <a14:useLocalDpi xmlns:a14="http://schemas.microsoft.com/office/drawing/2010/main" val="0"/>
+              </a:ext>
+            </a:extLst>
+          </a:blip>
+          <a:stretch>
+            <a:fillRect/>
+          </a:stretch>
+        </p:blipFill>
+        <p:spPr>
+          <a:xfrm>
+            <a:off x="2163518" y="1003515"/>
+            <a:ext cx="4456454" cy="2712624"/>
+          </a:xfrm>
+          <a:prstGeom prst="rect">
+            <a:avLst/>
+          </a:prstGeom>
+        </p:spPr>
+      </p:pic>
+      <p:sp>
+        <p:nvSpPr>
+          <p:cNvPr id="4" name="Title 3"/>
+          <p:cNvSpPr>
+            <a:spLocks noGrp="1"/>
+          </p:cNvSpPr>
+          <p:nvPr>
+            <p:ph type="title"/>
+          </p:nvPr>
+        </p:nvSpPr>
+        <p:spPr>
+          <a:xfrm>
+            <a:off x="457200" y="141120"/>
+            <a:ext cx="8229600" cy="862396"/>
+          </a:xfrm>
+        </p:spPr>
+        <p:txBody>
+          <a:bodyPr>
+            <a:normAutofit/>
+          </a:bodyPr>
+          <a:lstStyle/>
+          <a:p>
+            <a:r>
+              <a:rPr lang="en-US" sz="2400" dirty="0" smtClean="0">
+                <a:latin typeface="Helvetica Neue"/>
+                <a:cs typeface="Helvetica Neue"/>
+              </a:rPr>
+              <a:t>Explore adverse events within  group of events for a drug </a:t>
+            </a:r>
+            <a:r>
+              <a:rPr lang="en-US" sz="2400" dirty="0">
+                <a:latin typeface="Helvetica Neue"/>
+                <a:cs typeface="Helvetica Neue"/>
+              </a:rPr>
+              <a:t>(e.g., </a:t>
+            </a:r>
+            <a:r>
+              <a:rPr lang="en-US" sz="2400" dirty="0" smtClean="0">
+                <a:latin typeface="Helvetica Neue"/>
+                <a:cs typeface="Helvetica Neue"/>
+              </a:rPr>
+              <a:t>Pancreatitis) </a:t>
+            </a:r>
+            <a:endParaRPr lang="en-US" sz="2400" dirty="0">
+              <a:latin typeface="Helvetica Neue"/>
+              <a:cs typeface="Helvetica Neue"/>
+            </a:endParaRPr>
+          </a:p>
+        </p:txBody>
+      </p:sp>
+      <p:sp>
+        <p:nvSpPr>
+          <p:cNvPr id="5" name="TextBox 4"/>
+          <p:cNvSpPr txBox="1"/>
+          <p:nvPr/>
+        </p:nvSpPr>
+        <p:spPr>
+          <a:xfrm>
+            <a:off x="4921250" y="4648450"/>
+            <a:ext cx="3270250" cy="1477328"/>
+          </a:xfrm>
+          <a:prstGeom prst="rect">
+            <a:avLst/>
+          </a:prstGeom>
+          <a:noFill/>
+        </p:spPr>
+        <p:txBody>
+          <a:bodyPr wrap="square" rtlCol="0">
+            <a:spAutoFit/>
+          </a:bodyPr>
+          <a:lstStyle/>
+          <a:p>
+            <a:r>
+              <a:rPr lang="en-US" dirty="0" smtClean="0"/>
+              <a:t>Consumer or non-health pro.</a:t>
+            </a:r>
+          </a:p>
+          <a:p>
+            <a:r>
+              <a:rPr lang="en-US" dirty="0" smtClean="0"/>
+              <a:t>Physician</a:t>
+            </a:r>
+          </a:p>
+          <a:p>
+            <a:r>
+              <a:rPr lang="en-US" dirty="0" smtClean="0"/>
+              <a:t>Other health pro.</a:t>
+            </a:r>
+          </a:p>
+          <a:p>
+            <a:r>
+              <a:rPr lang="en-US" dirty="0" smtClean="0"/>
+              <a:t>Pharmacist</a:t>
+            </a:r>
+          </a:p>
+          <a:p>
+            <a:r>
+              <a:rPr lang="en-US" dirty="0" smtClean="0"/>
+              <a:t>Lawyer</a:t>
+            </a:r>
+            <a:endParaRPr lang="en-US" dirty="0"/>
+          </a:p>
+        </p:txBody>
+      </p:sp>
+      <p:sp>
+        <p:nvSpPr>
+          <p:cNvPr id="6" name="Rectangle 5"/>
+          <p:cNvSpPr>
+            <a:spLocks noChangeAspect="1"/>
+          </p:cNvSpPr>
+          <p:nvPr/>
+        </p:nvSpPr>
+        <p:spPr>
+          <a:xfrm>
+            <a:off x="4718061" y="4758210"/>
+            <a:ext cx="182880" cy="182880"/>
+          </a:xfrm>
+          <a:prstGeom prst="rect">
+            <a:avLst/>
+          </a:prstGeom>
+          <a:solidFill>
+            <a:schemeClr val="accent1">
+              <a:lumMod val="75000"/>
+            </a:schemeClr>
+          </a:solidFill>
+          <a:ln>
+            <a:noFill/>
+          </a:ln>
+          <a:effectLst/>
+        </p:spPr>
+        <p:style>
+          <a:lnRef idx="1">
+            <a:schemeClr val="accent1"/>
+          </a:lnRef>
+          <a:fillRef idx="3">
+            <a:schemeClr val="accent1"/>
+          </a:fillRef>
+          <a:effectRef idx="2">
+            <a:schemeClr val="accent1"/>
+          </a:effectRef>
+          <a:fontRef idx="minor">
+            <a:schemeClr val="lt1"/>
+          </a:fontRef>
+        </p:style>
+        <p:txBody>
+          <a:bodyPr rtlCol="0" anchor="ctr"/>
+          <a:lstStyle/>
+          <a:p>
+            <a:pPr algn="ctr"/>
+            <a:endParaRPr lang="en-US"/>
+          </a:p>
+        </p:txBody>
+      </p:sp>
+      <p:sp>
+        <p:nvSpPr>
+          <p:cNvPr id="7" name="Rectangle 6"/>
+          <p:cNvSpPr>
+            <a:spLocks noChangeAspect="1"/>
+          </p:cNvSpPr>
+          <p:nvPr/>
+        </p:nvSpPr>
+        <p:spPr>
+          <a:xfrm>
+            <a:off x="4718061" y="5032130"/>
+            <a:ext cx="182880" cy="182880"/>
+          </a:xfrm>
+          <a:prstGeom prst="rect">
+            <a:avLst/>
+          </a:prstGeom>
+          <a:solidFill>
+            <a:schemeClr val="accent1">
+              <a:lumMod val="40000"/>
+              <a:lumOff val="60000"/>
+            </a:schemeClr>
+          </a:solidFill>
+          <a:ln>
+            <a:noFill/>
+          </a:ln>
+          <a:effectLst/>
+        </p:spPr>
+        <p:style>
+          <a:lnRef idx="1">
+            <a:schemeClr val="accent1"/>
+          </a:lnRef>
+          <a:fillRef idx="3">
+            <a:schemeClr val="accent1"/>
+          </a:fillRef>
+          <a:effectRef idx="2">
+            <a:schemeClr val="accent1"/>
+          </a:effectRef>
+          <a:fontRef idx="minor">
+            <a:schemeClr val="lt1"/>
+          </a:fontRef>
+        </p:style>
+        <p:txBody>
+          <a:bodyPr rtlCol="0" anchor="ctr"/>
+          <a:lstStyle/>
+          <a:p>
+            <a:pPr algn="ctr"/>
+            <a:endParaRPr lang="en-US"/>
+          </a:p>
+        </p:txBody>
+      </p:sp>
+      <p:sp>
+        <p:nvSpPr>
+          <p:cNvPr id="8" name="Rectangle 7"/>
+          <p:cNvSpPr>
+            <a:spLocks noChangeAspect="1"/>
+          </p:cNvSpPr>
+          <p:nvPr/>
+        </p:nvSpPr>
+        <p:spPr>
+          <a:xfrm>
+            <a:off x="4718061" y="5306050"/>
+            <a:ext cx="182880" cy="182880"/>
+          </a:xfrm>
+          <a:prstGeom prst="rect">
+            <a:avLst/>
+          </a:prstGeom>
+          <a:solidFill>
+            <a:schemeClr val="accent6"/>
+          </a:solidFill>
+          <a:ln>
+            <a:noFill/>
+          </a:ln>
+          <a:effectLst/>
+        </p:spPr>
+        <p:style>
+          <a:lnRef idx="1">
+            <a:schemeClr val="accent1"/>
+          </a:lnRef>
+          <a:fillRef idx="3">
+            <a:schemeClr val="accent1"/>
+          </a:fillRef>
+          <a:effectRef idx="2">
+            <a:schemeClr val="accent1"/>
+          </a:effectRef>
+          <a:fontRef idx="minor">
+            <a:schemeClr val="lt1"/>
+          </a:fontRef>
+        </p:style>
+        <p:txBody>
+          <a:bodyPr rtlCol="0" anchor="ctr"/>
+          <a:lstStyle/>
+          <a:p>
+            <a:pPr algn="ctr"/>
+            <a:endParaRPr lang="en-US"/>
+          </a:p>
+        </p:txBody>
+      </p:sp>
+      <p:sp>
+        <p:nvSpPr>
+          <p:cNvPr id="9" name="Rectangle 8"/>
+          <p:cNvSpPr>
+            <a:spLocks noChangeAspect="1"/>
+          </p:cNvSpPr>
+          <p:nvPr/>
+        </p:nvSpPr>
+        <p:spPr>
+          <a:xfrm>
+            <a:off x="4718061" y="5579970"/>
+            <a:ext cx="182880" cy="182880"/>
+          </a:xfrm>
+          <a:prstGeom prst="rect">
+            <a:avLst/>
+          </a:prstGeom>
+          <a:solidFill>
+            <a:schemeClr val="accent6">
+              <a:lumMod val="20000"/>
+              <a:lumOff val="80000"/>
+            </a:schemeClr>
+          </a:solidFill>
+          <a:ln>
+            <a:noFill/>
+          </a:ln>
+          <a:effectLst/>
+        </p:spPr>
+        <p:style>
+          <a:lnRef idx="1">
+            <a:schemeClr val="accent1"/>
+          </a:lnRef>
+          <a:fillRef idx="3">
+            <a:schemeClr val="accent1"/>
+          </a:fillRef>
+          <a:effectRef idx="2">
+            <a:schemeClr val="accent1"/>
+          </a:effectRef>
+          <a:fontRef idx="minor">
+            <a:schemeClr val="lt1"/>
+          </a:fontRef>
+        </p:style>
+        <p:txBody>
+          <a:bodyPr rtlCol="0" anchor="ctr"/>
+          <a:lstStyle/>
+          <a:p>
+            <a:pPr algn="ctr"/>
+            <a:endParaRPr lang="en-US"/>
+          </a:p>
+        </p:txBody>
+      </p:sp>
+      <p:sp>
+        <p:nvSpPr>
+          <p:cNvPr id="10" name="Rectangle 9"/>
+          <p:cNvSpPr>
+            <a:spLocks noChangeAspect="1"/>
+          </p:cNvSpPr>
+          <p:nvPr/>
+        </p:nvSpPr>
+        <p:spPr>
+          <a:xfrm>
+            <a:off x="4718061" y="5853890"/>
+            <a:ext cx="182880" cy="182880"/>
+          </a:xfrm>
+          <a:prstGeom prst="rect">
+            <a:avLst/>
+          </a:prstGeom>
+          <a:solidFill>
+            <a:srgbClr val="008000"/>
+          </a:solidFill>
+          <a:ln>
+            <a:noFill/>
+          </a:ln>
+          <a:effectLst/>
+        </p:spPr>
+        <p:style>
+          <a:lnRef idx="1">
+            <a:schemeClr val="accent1"/>
+          </a:lnRef>
+          <a:fillRef idx="3">
+            <a:schemeClr val="accent1"/>
+          </a:fillRef>
+          <a:effectRef idx="2">
+            <a:schemeClr val="accent1"/>
+          </a:effectRef>
+          <a:fontRef idx="minor">
+            <a:schemeClr val="lt1"/>
+          </a:fontRef>
+        </p:style>
+        <p:txBody>
+          <a:bodyPr rtlCol="0" anchor="ctr"/>
+          <a:lstStyle/>
+          <a:p>
+            <a:pPr algn="ctr"/>
+            <a:endParaRPr lang="en-US"/>
+          </a:p>
+        </p:txBody>
+      </p:sp>
+    </p:spTree>
+    <p:extLst>
+      <p:ext uri="{BB962C8B-B14F-4D97-AF65-F5344CB8AC3E}">
+        <p14:creationId xmlns:p14="http://schemas.microsoft.com/office/powerpoint/2010/main" val="3873650590"/>
       </p:ext>
     </p:extLst>
   </p:cSld>

</xml_diff>

<commit_message>
Add references for different chart types.
</commit_message>
<xml_diff>
--- a/doc/design_artifacts/drug_detail_mockup.pptx
+++ b/doc/design_artifacts/drug_detail_mockup.pptx
@@ -3865,6 +3865,67 @@
           </a:fontRef>
         </p:style>
       </p:cxnSp>
+      <p:sp>
+        <p:nvSpPr>
+          <p:cNvPr id="7" name="Rectangle 6"/>
+          <p:cNvSpPr/>
+          <p:nvPr/>
+        </p:nvSpPr>
+        <p:spPr>
+          <a:xfrm>
+            <a:off x="156776" y="6363667"/>
+            <a:ext cx="4572000" cy="461665"/>
+          </a:xfrm>
+          <a:prstGeom prst="rect">
+            <a:avLst/>
+          </a:prstGeom>
+        </p:spPr>
+        <p:txBody>
+          <a:bodyPr>
+            <a:spAutoFit/>
+          </a:bodyPr>
+          <a:lstStyle/>
+          <a:p>
+            <a:r>
+              <a:rPr lang="en-US" sz="1200" dirty="0">
+                <a:latin typeface="Helvetica"/>
+                <a:cs typeface="Helvetica"/>
+              </a:rPr>
+              <a:t>http://mbostock.github.io/d3/talk/20111018/</a:t>
+            </a:r>
+            <a:r>
+              <a:rPr lang="en-US" sz="1200" dirty="0" smtClean="0">
+                <a:latin typeface="Helvetica"/>
+                <a:cs typeface="Helvetica"/>
+              </a:rPr>
+              <a:t>tree.html</a:t>
+            </a:r>
+          </a:p>
+          <a:p>
+            <a:r>
+              <a:rPr lang="en-US" sz="1200" dirty="0">
+                <a:latin typeface="Helvetica"/>
+                <a:cs typeface="Helvetica"/>
+              </a:rPr>
+              <a:t>https://</a:t>
+            </a:r>
+            <a:r>
+              <a:rPr lang="en-US" sz="1200" dirty="0" err="1">
+                <a:latin typeface="Helvetica"/>
+                <a:cs typeface="Helvetica"/>
+              </a:rPr>
+              <a:t>mohansun-canvas.herokuapp.com</a:t>
+            </a:r>
+            <a:r>
+              <a:rPr lang="en-US" sz="1200" dirty="0">
+                <a:latin typeface="Helvetica"/>
+                <a:cs typeface="Helvetica"/>
+              </a:rPr>
+              <a:t>/content/training/</a:t>
+            </a:r>
+          </a:p>
+        </p:txBody>
+      </p:sp>
     </p:spTree>
     <p:extLst>
       <p:ext uri="{BB962C8B-B14F-4D97-AF65-F5344CB8AC3E}">
@@ -4395,6 +4456,110 @@
           <a:p>
             <a:pPr algn="ctr"/>
             <a:endParaRPr lang="en-US"/>
+          </a:p>
+        </p:txBody>
+      </p:sp>
+      <p:sp>
+        <p:nvSpPr>
+          <p:cNvPr id="11" name="Rectangle 10"/>
+          <p:cNvSpPr/>
+          <p:nvPr/>
+        </p:nvSpPr>
+        <p:spPr>
+          <a:xfrm>
+            <a:off x="269068" y="3836582"/>
+            <a:ext cx="7365956" cy="276999"/>
+          </a:xfrm>
+          <a:prstGeom prst="rect">
+            <a:avLst/>
+          </a:prstGeom>
+        </p:spPr>
+        <p:txBody>
+          <a:bodyPr wrap="square">
+            <a:spAutoFit/>
+          </a:bodyPr>
+          <a:lstStyle/>
+          <a:p>
+            <a:r>
+              <a:rPr lang="en-US" sz="1200" dirty="0">
+                <a:latin typeface="Helvetica"/>
+                <a:cs typeface="Helvetica"/>
+              </a:rPr>
+              <a:t>http://</a:t>
+            </a:r>
+            <a:r>
+              <a:rPr lang="en-US" sz="1200" dirty="0" err="1">
+                <a:latin typeface="Helvetica"/>
+                <a:cs typeface="Helvetica"/>
+              </a:rPr>
+              <a:t>stackoverflow.com</a:t>
+            </a:r>
+            <a:r>
+              <a:rPr lang="en-US" sz="1200" dirty="0">
+                <a:latin typeface="Helvetica"/>
+                <a:cs typeface="Helvetica"/>
+              </a:rPr>
+              <a:t>/questions/25044997/creating-population-pyramid-with-d3-js</a:t>
+            </a:r>
+          </a:p>
+        </p:txBody>
+      </p:sp>
+      <p:sp>
+        <p:nvSpPr>
+          <p:cNvPr id="12" name="Rectangle 11"/>
+          <p:cNvSpPr/>
+          <p:nvPr/>
+        </p:nvSpPr>
+        <p:spPr>
+          <a:xfrm>
+            <a:off x="269068" y="6581001"/>
+            <a:ext cx="7365956" cy="276999"/>
+          </a:xfrm>
+          <a:prstGeom prst="rect">
+            <a:avLst/>
+          </a:prstGeom>
+        </p:spPr>
+        <p:txBody>
+          <a:bodyPr wrap="square">
+            <a:spAutoFit/>
+          </a:bodyPr>
+          <a:lstStyle/>
+          <a:p>
+            <a:r>
+              <a:rPr lang="en-US" sz="1200" dirty="0">
+                <a:latin typeface="Helvetica"/>
+                <a:cs typeface="Helvetica"/>
+              </a:rPr>
+              <a:t>http://</a:t>
+            </a:r>
+            <a:r>
+              <a:rPr lang="en-US" sz="1200" dirty="0" err="1">
+                <a:latin typeface="Helvetica"/>
+                <a:cs typeface="Helvetica"/>
+              </a:rPr>
+              <a:t>jsfiddle.net</a:t>
+            </a:r>
+            <a:r>
+              <a:rPr lang="en-US" sz="1200" dirty="0">
+                <a:latin typeface="Helvetica"/>
+                <a:cs typeface="Helvetica"/>
+              </a:rPr>
+              <a:t>/</a:t>
+            </a:r>
+            <a:r>
+              <a:rPr lang="en-US" sz="1200" dirty="0" err="1">
+                <a:latin typeface="Helvetica"/>
+                <a:cs typeface="Helvetica"/>
+              </a:rPr>
+              <a:t>gregfedorov</a:t>
+            </a:r>
+            <a:r>
+              <a:rPr lang="en-US" sz="1200" dirty="0">
+                <a:latin typeface="Helvetica"/>
+                <a:cs typeface="Helvetica"/>
+              </a:rPr>
+              <a:t>/qh9x5/9/</a:t>
+            </a:r>
           </a:p>
         </p:txBody>
       </p:sp>

</xml_diff>